<commit_message>
Update DG and PPP
</commit_message>
<xml_diff>
--- a/docs/diagrams/SearchCommandActivityDiagram.pptx
+++ b/docs/diagrams/SearchCommandActivityDiagram.pptx
@@ -261,7 +261,7 @@
           <a:p>
             <a:fld id="{542F47FF-5056-41FF-A1F8-23A414798AA4}" type="datetimeFigureOut">
               <a:rPr lang="en-SG" smtClean="0"/>
-              <a:t>7/4/2019</a:t>
+              <a:t>9/4/2019</a:t>
             </a:fld>
             <a:endParaRPr lang="en-SG"/>
           </a:p>
@@ -461,7 +461,7 @@
           <a:p>
             <a:fld id="{542F47FF-5056-41FF-A1F8-23A414798AA4}" type="datetimeFigureOut">
               <a:rPr lang="en-SG" smtClean="0"/>
-              <a:t>7/4/2019</a:t>
+              <a:t>9/4/2019</a:t>
             </a:fld>
             <a:endParaRPr lang="en-SG"/>
           </a:p>
@@ -671,7 +671,7 @@
           <a:p>
             <a:fld id="{542F47FF-5056-41FF-A1F8-23A414798AA4}" type="datetimeFigureOut">
               <a:rPr lang="en-SG" smtClean="0"/>
-              <a:t>7/4/2019</a:t>
+              <a:t>9/4/2019</a:t>
             </a:fld>
             <a:endParaRPr lang="en-SG"/>
           </a:p>
@@ -871,7 +871,7 @@
           <a:p>
             <a:fld id="{542F47FF-5056-41FF-A1F8-23A414798AA4}" type="datetimeFigureOut">
               <a:rPr lang="en-SG" smtClean="0"/>
-              <a:t>7/4/2019</a:t>
+              <a:t>9/4/2019</a:t>
             </a:fld>
             <a:endParaRPr lang="en-SG"/>
           </a:p>
@@ -1147,7 +1147,7 @@
           <a:p>
             <a:fld id="{542F47FF-5056-41FF-A1F8-23A414798AA4}" type="datetimeFigureOut">
               <a:rPr lang="en-SG" smtClean="0"/>
-              <a:t>7/4/2019</a:t>
+              <a:t>9/4/2019</a:t>
             </a:fld>
             <a:endParaRPr lang="en-SG"/>
           </a:p>
@@ -1415,7 +1415,7 @@
           <a:p>
             <a:fld id="{542F47FF-5056-41FF-A1F8-23A414798AA4}" type="datetimeFigureOut">
               <a:rPr lang="en-SG" smtClean="0"/>
-              <a:t>7/4/2019</a:t>
+              <a:t>9/4/2019</a:t>
             </a:fld>
             <a:endParaRPr lang="en-SG"/>
           </a:p>
@@ -1830,7 +1830,7 @@
           <a:p>
             <a:fld id="{542F47FF-5056-41FF-A1F8-23A414798AA4}" type="datetimeFigureOut">
               <a:rPr lang="en-SG" smtClean="0"/>
-              <a:t>7/4/2019</a:t>
+              <a:t>9/4/2019</a:t>
             </a:fld>
             <a:endParaRPr lang="en-SG"/>
           </a:p>
@@ -1972,7 +1972,7 @@
           <a:p>
             <a:fld id="{542F47FF-5056-41FF-A1F8-23A414798AA4}" type="datetimeFigureOut">
               <a:rPr lang="en-SG" smtClean="0"/>
-              <a:t>7/4/2019</a:t>
+              <a:t>9/4/2019</a:t>
             </a:fld>
             <a:endParaRPr lang="en-SG"/>
           </a:p>
@@ -2085,7 +2085,7 @@
           <a:p>
             <a:fld id="{542F47FF-5056-41FF-A1F8-23A414798AA4}" type="datetimeFigureOut">
               <a:rPr lang="en-SG" smtClean="0"/>
-              <a:t>7/4/2019</a:t>
+              <a:t>9/4/2019</a:t>
             </a:fld>
             <a:endParaRPr lang="en-SG"/>
           </a:p>
@@ -2398,7 +2398,7 @@
           <a:p>
             <a:fld id="{542F47FF-5056-41FF-A1F8-23A414798AA4}" type="datetimeFigureOut">
               <a:rPr lang="en-SG" smtClean="0"/>
-              <a:t>7/4/2019</a:t>
+              <a:t>9/4/2019</a:t>
             </a:fld>
             <a:endParaRPr lang="en-SG"/>
           </a:p>
@@ -2687,7 +2687,7 @@
           <a:p>
             <a:fld id="{542F47FF-5056-41FF-A1F8-23A414798AA4}" type="datetimeFigureOut">
               <a:rPr lang="en-SG" smtClean="0"/>
-              <a:t>7/4/2019</a:t>
+              <a:t>9/4/2019</a:t>
             </a:fld>
             <a:endParaRPr lang="en-SG"/>
           </a:p>
@@ -2930,7 +2930,7 @@
           <a:p>
             <a:fld id="{542F47FF-5056-41FF-A1F8-23A414798AA4}" type="datetimeFigureOut">
               <a:rPr lang="en-SG" smtClean="0"/>
-              <a:t>7/4/2019</a:t>
+              <a:t>9/4/2019</a:t>
             </a:fld>
             <a:endParaRPr lang="en-SG"/>
           </a:p>
@@ -4078,15 +4078,7 @@
             <a:pPr algn="ctr"/>
             <a:r>
               <a:rPr lang="en-SG" dirty="0"/>
-              <a:t>Throw a </a:t>
-            </a:r>
-            <a:r>
-              <a:rPr lang="en-SG" dirty="0" err="1"/>
-              <a:t>ParseException</a:t>
-            </a:r>
-            <a:r>
-              <a:rPr lang="en-SG" dirty="0"/>
-              <a:t> for invalid command</a:t>
+              <a:t>Throw a ParseException for invalid command</a:t>
             </a:r>
           </a:p>
         </p:txBody>
@@ -4138,13 +4130,8 @@
             <a:pPr algn="ctr"/>
             <a:r>
               <a:rPr lang="en-SG" sz="1801" dirty="0"/>
-              <a:t>Parsed by </a:t>
-            </a:r>
-            <a:r>
-              <a:rPr lang="en-SG" sz="1801" dirty="0" err="1"/>
-              <a:t>TravelBuddyParser</a:t>
-            </a:r>
-            <a:endParaRPr lang="en-SG" sz="1801" dirty="0"/>
+              <a:t>Parsed by TravelBuddyParser</a:t>
+            </a:r>
           </a:p>
         </p:txBody>
       </p:sp>
@@ -4237,13 +4224,8 @@
             <a:pPr algn="ctr"/>
             <a:r>
               <a:rPr lang="en-SG" sz="1801" dirty="0"/>
-              <a:t>Parsed by </a:t>
-            </a:r>
-            <a:r>
-              <a:rPr lang="en-SG" sz="1801" dirty="0" err="1"/>
-              <a:t>SearchCommandParser</a:t>
-            </a:r>
-            <a:endParaRPr lang="en-SG" sz="1801" dirty="0"/>
+              <a:t>Parsed by SearchCommandParser</a:t>
+            </a:r>
           </a:p>
         </p:txBody>
       </p:sp>
@@ -4498,15 +4480,7 @@
             <a:pPr algn="ctr"/>
             <a:r>
               <a:rPr lang="en-SG" dirty="0"/>
-              <a:t>Throw a </a:t>
-            </a:r>
-            <a:r>
-              <a:rPr lang="en-SG" dirty="0" err="1"/>
-              <a:t>ParseException</a:t>
-            </a:r>
-            <a:r>
-              <a:rPr lang="en-SG" dirty="0"/>
-              <a:t> for invalid command format</a:t>
+              <a:t>Throw a ParseException for invalid command format</a:t>
             </a:r>
           </a:p>
         </p:txBody>

</xml_diff>